<commit_message>
upload materials for presentation
</commit_message>
<xml_diff>
--- a/documentation/Project2.pptx
+++ b/documentation/Project2.pptx
@@ -5,7 +5,7 @@
     <p:sldMasterId id="2147483648" r:id="rId1"/>
   </p:sldMasterIdLst>
   <p:notesMasterIdLst>
-    <p:notesMasterId r:id="rId9"/>
+    <p:notesMasterId r:id="rId12"/>
   </p:notesMasterIdLst>
   <p:sldIdLst>
     <p:sldId id="256" r:id="rId2"/>
@@ -15,6 +15,9 @@
     <p:sldId id="257" r:id="rId6"/>
     <p:sldId id="259" r:id="rId7"/>
     <p:sldId id="260" r:id="rId8"/>
+    <p:sldId id="264" r:id="rId9"/>
+    <p:sldId id="266" r:id="rId10"/>
+    <p:sldId id="265" r:id="rId11"/>
   </p:sldIdLst>
   <p:sldSz cx="9144000" cy="6858000" type="screen4x3"/>
   <p:notesSz cx="6858000" cy="9144000"/>
@@ -3796,6 +3799,142 @@
 </p:sld>
 </file>
 
+<file path=ppt/slides/slide10.xml><?xml version="1.0" encoding="utf-8"?>
+<p:sld xmlns:a="http://schemas.openxmlformats.org/drawingml/2006/main" xmlns:r="http://schemas.openxmlformats.org/officeDocument/2006/relationships" xmlns:p="http://schemas.openxmlformats.org/presentationml/2006/main">
+  <p:cSld>
+    <p:spTree>
+      <p:nvGrpSpPr>
+        <p:cNvPr id="1" name=""/>
+        <p:cNvGrpSpPr/>
+        <p:nvPr/>
+      </p:nvGrpSpPr>
+      <p:grpSpPr>
+        <a:xfrm>
+          <a:off x="0" y="0"/>
+          <a:ext cx="0" cy="0"/>
+          <a:chOff x="0" y="0"/>
+          <a:chExt cx="0" cy="0"/>
+        </a:xfrm>
+      </p:grpSpPr>
+      <p:sp>
+        <p:nvSpPr>
+          <p:cNvPr id="2" name="Title 1"/>
+          <p:cNvSpPr>
+            <a:spLocks noGrp="1"/>
+          </p:cNvSpPr>
+          <p:nvPr>
+            <p:ph type="title"/>
+          </p:nvPr>
+        </p:nvSpPr>
+        <p:spPr/>
+        <p:txBody>
+          <a:bodyPr/>
+          <a:lstStyle/>
+          <a:p>
+            <a:r>
+              <a:rPr lang="en-US" dirty="0" smtClean="0"/>
+              <a:t>Code Snippet – populate multiple</a:t>
+            </a:r>
+            <a:endParaRPr lang="en-US" dirty="0"/>
+          </a:p>
+        </p:txBody>
+      </p:sp>
+      <p:pic>
+        <p:nvPicPr>
+          <p:cNvPr id="5" name="Picture 4"/>
+          <p:cNvPicPr>
+            <a:picLocks noChangeAspect="1"/>
+          </p:cNvPicPr>
+          <p:nvPr/>
+        </p:nvPicPr>
+        <p:blipFill>
+          <a:blip r:embed="rId2">
+            <a:extLst>
+              <a:ext uri="{28A0092B-C50C-407E-A947-70E740481C1C}">
+                <a14:useLocalDpi xmlns:a14="http://schemas.microsoft.com/office/drawing/2010/main" val="0"/>
+              </a:ext>
+            </a:extLst>
+          </a:blip>
+          <a:stretch>
+            <a:fillRect/>
+          </a:stretch>
+        </p:blipFill>
+        <p:spPr>
+          <a:xfrm>
+            <a:off x="543525" y="1295400"/>
+            <a:ext cx="7914675" cy="5105400"/>
+          </a:xfrm>
+          <a:prstGeom prst="rect">
+            <a:avLst/>
+          </a:prstGeom>
+        </p:spPr>
+      </p:pic>
+      <p:sp>
+        <p:nvSpPr>
+          <p:cNvPr id="6" name="Rectangle 5"/>
+          <p:cNvSpPr/>
+          <p:nvPr/>
+        </p:nvSpPr>
+        <p:spPr>
+          <a:xfrm>
+            <a:off x="762000" y="4648200"/>
+            <a:ext cx="7848600" cy="304800"/>
+          </a:xfrm>
+          <a:prstGeom prst="rect">
+            <a:avLst/>
+          </a:prstGeom>
+          <a:noFill/>
+          <a:ln>
+            <a:solidFill>
+              <a:srgbClr val="FF0000"/>
+            </a:solidFill>
+          </a:ln>
+        </p:spPr>
+        <p:style>
+          <a:lnRef idx="2">
+            <a:schemeClr val="accent1">
+              <a:shade val="50000"/>
+            </a:schemeClr>
+          </a:lnRef>
+          <a:fillRef idx="1">
+            <a:schemeClr val="accent1"/>
+          </a:fillRef>
+          <a:effectRef idx="0">
+            <a:schemeClr val="accent1"/>
+          </a:effectRef>
+          <a:fontRef idx="minor">
+            <a:schemeClr val="lt1"/>
+          </a:fontRef>
+        </p:style>
+        <p:txBody>
+          <a:bodyPr rtlCol="0" anchor="ctr"/>
+          <a:lstStyle/>
+          <a:p>
+            <a:pPr algn="ctr"/>
+            <a:endParaRPr lang="en-US"/>
+          </a:p>
+        </p:txBody>
+      </p:sp>
+    </p:spTree>
+    <p:extLst>
+      <p:ext uri="{BB962C8B-B14F-4D97-AF65-F5344CB8AC3E}">
+        <p14:creationId xmlns:p14="http://schemas.microsoft.com/office/powerpoint/2010/main" val="2149514209"/>
+      </p:ext>
+    </p:extLst>
+  </p:cSld>
+  <p:clrMapOvr>
+    <a:masterClrMapping/>
+  </p:clrMapOvr>
+  <p:timing>
+    <p:tnLst>
+      <p:par>
+        <p:cTn id="1" dur="indefinite" restart="never" nodeType="tmRoot"/>
+      </p:par>
+    </p:tnLst>
+  </p:timing>
+</p:sld>
+</file>
+
 <file path=ppt/slides/slide2.xml><?xml version="1.0" encoding="utf-8"?>
 <p:sld xmlns:a="http://schemas.openxmlformats.org/drawingml/2006/main" xmlns:r="http://schemas.openxmlformats.org/officeDocument/2006/relationships" xmlns:p="http://schemas.openxmlformats.org/presentationml/2006/main">
   <p:cSld>
@@ -8543,6 +8682,334 @@
     <p:extLst>
       <p:ext uri="{BB962C8B-B14F-4D97-AF65-F5344CB8AC3E}">
         <p14:creationId xmlns:p14="http://schemas.microsoft.com/office/powerpoint/2010/main" val="1471538660"/>
+      </p:ext>
+    </p:extLst>
+  </p:cSld>
+  <p:clrMapOvr>
+    <a:masterClrMapping/>
+  </p:clrMapOvr>
+  <p:timing>
+    <p:tnLst>
+      <p:par>
+        <p:cTn id="1" dur="indefinite" restart="never" nodeType="tmRoot"/>
+      </p:par>
+    </p:tnLst>
+  </p:timing>
+</p:sld>
+</file>
+
+<file path=ppt/slides/slide8.xml><?xml version="1.0" encoding="utf-8"?>
+<p:sld xmlns:a="http://schemas.openxmlformats.org/drawingml/2006/main" xmlns:r="http://schemas.openxmlformats.org/officeDocument/2006/relationships" xmlns:p="http://schemas.openxmlformats.org/presentationml/2006/main">
+  <p:cSld>
+    <p:spTree>
+      <p:nvGrpSpPr>
+        <p:cNvPr id="1" name=""/>
+        <p:cNvGrpSpPr/>
+        <p:nvPr/>
+      </p:nvGrpSpPr>
+      <p:grpSpPr>
+        <a:xfrm>
+          <a:off x="0" y="0"/>
+          <a:ext cx="0" cy="0"/>
+          <a:chOff x="0" y="0"/>
+          <a:chExt cx="0" cy="0"/>
+        </a:xfrm>
+      </p:grpSpPr>
+      <p:sp>
+        <p:nvSpPr>
+          <p:cNvPr id="2" name="Title 1"/>
+          <p:cNvSpPr>
+            <a:spLocks noGrp="1"/>
+          </p:cNvSpPr>
+          <p:nvPr>
+            <p:ph type="title"/>
+          </p:nvPr>
+        </p:nvSpPr>
+        <p:spPr/>
+        <p:txBody>
+          <a:bodyPr/>
+          <a:lstStyle/>
+          <a:p>
+            <a:r>
+              <a:rPr lang="en-US" dirty="0" smtClean="0"/>
+              <a:t>Code Snippet – ajax call</a:t>
+            </a:r>
+            <a:endParaRPr lang="en-US" dirty="0"/>
+          </a:p>
+        </p:txBody>
+      </p:sp>
+      <p:pic>
+        <p:nvPicPr>
+          <p:cNvPr id="4" name="Picture 3"/>
+          <p:cNvPicPr>
+            <a:picLocks noChangeAspect="1"/>
+          </p:cNvPicPr>
+          <p:nvPr/>
+        </p:nvPicPr>
+        <p:blipFill>
+          <a:blip r:embed="rId2">
+            <a:extLst>
+              <a:ext uri="{28A0092B-C50C-407E-A947-70E740481C1C}">
+                <a14:useLocalDpi xmlns:a14="http://schemas.microsoft.com/office/drawing/2010/main" val="0"/>
+              </a:ext>
+            </a:extLst>
+          </a:blip>
+          <a:stretch>
+            <a:fillRect/>
+          </a:stretch>
+        </p:blipFill>
+        <p:spPr>
+          <a:xfrm>
+            <a:off x="609600" y="1600200"/>
+            <a:ext cx="7497131" cy="4672012"/>
+          </a:xfrm>
+          <a:prstGeom prst="rect">
+            <a:avLst/>
+          </a:prstGeom>
+        </p:spPr>
+      </p:pic>
+      <p:sp>
+        <p:nvSpPr>
+          <p:cNvPr id="5" name="Rectangle 4"/>
+          <p:cNvSpPr/>
+          <p:nvPr/>
+        </p:nvSpPr>
+        <p:spPr>
+          <a:xfrm>
+            <a:off x="609600" y="3352800"/>
+            <a:ext cx="7497131" cy="1981200"/>
+          </a:xfrm>
+          <a:prstGeom prst="rect">
+            <a:avLst/>
+          </a:prstGeom>
+          <a:noFill/>
+          <a:ln>
+            <a:solidFill>
+              <a:srgbClr val="FF0000"/>
+            </a:solidFill>
+          </a:ln>
+        </p:spPr>
+        <p:style>
+          <a:lnRef idx="2">
+            <a:schemeClr val="accent1">
+              <a:shade val="50000"/>
+            </a:schemeClr>
+          </a:lnRef>
+          <a:fillRef idx="1">
+            <a:schemeClr val="accent1"/>
+          </a:fillRef>
+          <a:effectRef idx="0">
+            <a:schemeClr val="accent1"/>
+          </a:effectRef>
+          <a:fontRef idx="minor">
+            <a:schemeClr val="lt1"/>
+          </a:fontRef>
+        </p:style>
+        <p:txBody>
+          <a:bodyPr rtlCol="0" anchor="ctr"/>
+          <a:lstStyle/>
+          <a:p>
+            <a:pPr algn="ctr"/>
+            <a:endParaRPr lang="en-US"/>
+          </a:p>
+        </p:txBody>
+      </p:sp>
+    </p:spTree>
+    <p:extLst>
+      <p:ext uri="{BB962C8B-B14F-4D97-AF65-F5344CB8AC3E}">
+        <p14:creationId xmlns:p14="http://schemas.microsoft.com/office/powerpoint/2010/main" val="4112287495"/>
+      </p:ext>
+    </p:extLst>
+  </p:cSld>
+  <p:clrMapOvr>
+    <a:masterClrMapping/>
+  </p:clrMapOvr>
+  <p:timing>
+    <p:tnLst>
+      <p:par>
+        <p:cTn id="1" dur="indefinite" restart="never" nodeType="tmRoot"/>
+      </p:par>
+    </p:tnLst>
+  </p:timing>
+</p:sld>
+</file>
+
+<file path=ppt/slides/slide9.xml><?xml version="1.0" encoding="utf-8"?>
+<p:sld xmlns:a="http://schemas.openxmlformats.org/drawingml/2006/main" xmlns:r="http://schemas.openxmlformats.org/officeDocument/2006/relationships" xmlns:p="http://schemas.openxmlformats.org/presentationml/2006/main">
+  <p:cSld>
+    <p:spTree>
+      <p:nvGrpSpPr>
+        <p:cNvPr id="1" name=""/>
+        <p:cNvGrpSpPr/>
+        <p:nvPr/>
+      </p:nvGrpSpPr>
+      <p:grpSpPr>
+        <a:xfrm>
+          <a:off x="0" y="0"/>
+          <a:ext cx="0" cy="0"/>
+          <a:chOff x="0" y="0"/>
+          <a:chExt cx="0" cy="0"/>
+        </a:xfrm>
+      </p:grpSpPr>
+      <p:sp>
+        <p:nvSpPr>
+          <p:cNvPr id="2" name="Title 1"/>
+          <p:cNvSpPr>
+            <a:spLocks noGrp="1"/>
+          </p:cNvSpPr>
+          <p:nvPr>
+            <p:ph type="title"/>
+          </p:nvPr>
+        </p:nvSpPr>
+        <p:spPr/>
+        <p:txBody>
+          <a:bodyPr>
+            <a:normAutofit fontScale="90000"/>
+          </a:bodyPr>
+          <a:lstStyle/>
+          <a:p>
+            <a:r>
+              <a:rPr lang="en-US" dirty="0" smtClean="0"/>
+              <a:t>Code Snippet – handling </a:t>
+            </a:r>
+            <a:r>
+              <a:rPr lang="en-US" dirty="0" err="1" smtClean="0"/>
+              <a:t>async</a:t>
+            </a:r>
+            <a:r>
+              <a:rPr lang="en-US" dirty="0" smtClean="0"/>
+              <a:t> event</a:t>
+            </a:r>
+            <a:endParaRPr lang="en-US" dirty="0"/>
+          </a:p>
+        </p:txBody>
+      </p:sp>
+      <p:pic>
+        <p:nvPicPr>
+          <p:cNvPr id="3" name="Picture 2"/>
+          <p:cNvPicPr>
+            <a:picLocks noChangeAspect="1"/>
+          </p:cNvPicPr>
+          <p:nvPr/>
+        </p:nvPicPr>
+        <p:blipFill>
+          <a:blip r:embed="rId2">
+            <a:extLst>
+              <a:ext uri="{28A0092B-C50C-407E-A947-70E740481C1C}">
+                <a14:useLocalDpi xmlns:a14="http://schemas.microsoft.com/office/drawing/2010/main" val="0"/>
+              </a:ext>
+            </a:extLst>
+          </a:blip>
+          <a:stretch>
+            <a:fillRect/>
+          </a:stretch>
+        </p:blipFill>
+        <p:spPr>
+          <a:xfrm>
+            <a:off x="838200" y="1381539"/>
+            <a:ext cx="7772400" cy="4972405"/>
+          </a:xfrm>
+          <a:prstGeom prst="rect">
+            <a:avLst/>
+          </a:prstGeom>
+        </p:spPr>
+      </p:pic>
+      <p:sp>
+        <p:nvSpPr>
+          <p:cNvPr id="5" name="Rectangle 4"/>
+          <p:cNvSpPr/>
+          <p:nvPr/>
+        </p:nvSpPr>
+        <p:spPr>
+          <a:xfrm>
+            <a:off x="762000" y="2209800"/>
+            <a:ext cx="7848600" cy="304800"/>
+          </a:xfrm>
+          <a:prstGeom prst="rect">
+            <a:avLst/>
+          </a:prstGeom>
+          <a:noFill/>
+          <a:ln>
+            <a:solidFill>
+              <a:srgbClr val="FF0000"/>
+            </a:solidFill>
+          </a:ln>
+        </p:spPr>
+        <p:style>
+          <a:lnRef idx="2">
+            <a:schemeClr val="accent1">
+              <a:shade val="50000"/>
+            </a:schemeClr>
+          </a:lnRef>
+          <a:fillRef idx="1">
+            <a:schemeClr val="accent1"/>
+          </a:fillRef>
+          <a:effectRef idx="0">
+            <a:schemeClr val="accent1"/>
+          </a:effectRef>
+          <a:fontRef idx="minor">
+            <a:schemeClr val="lt1"/>
+          </a:fontRef>
+        </p:style>
+        <p:txBody>
+          <a:bodyPr rtlCol="0" anchor="ctr"/>
+          <a:lstStyle/>
+          <a:p>
+            <a:pPr algn="ctr"/>
+            <a:endParaRPr lang="en-US"/>
+          </a:p>
+        </p:txBody>
+      </p:sp>
+      <p:sp>
+        <p:nvSpPr>
+          <p:cNvPr id="6" name="Rectangle 5"/>
+          <p:cNvSpPr/>
+          <p:nvPr/>
+        </p:nvSpPr>
+        <p:spPr>
+          <a:xfrm>
+            <a:off x="914400" y="3276600"/>
+            <a:ext cx="7848600" cy="304800"/>
+          </a:xfrm>
+          <a:prstGeom prst="rect">
+            <a:avLst/>
+          </a:prstGeom>
+          <a:noFill/>
+          <a:ln>
+            <a:solidFill>
+              <a:srgbClr val="FF0000"/>
+            </a:solidFill>
+          </a:ln>
+        </p:spPr>
+        <p:style>
+          <a:lnRef idx="2">
+            <a:schemeClr val="accent1">
+              <a:shade val="50000"/>
+            </a:schemeClr>
+          </a:lnRef>
+          <a:fillRef idx="1">
+            <a:schemeClr val="accent1"/>
+          </a:fillRef>
+          <a:effectRef idx="0">
+            <a:schemeClr val="accent1"/>
+          </a:effectRef>
+          <a:fontRef idx="minor">
+            <a:schemeClr val="lt1"/>
+          </a:fontRef>
+        </p:style>
+        <p:txBody>
+          <a:bodyPr rtlCol="0" anchor="ctr"/>
+          <a:lstStyle/>
+          <a:p>
+            <a:pPr algn="ctr"/>
+            <a:endParaRPr lang="en-US"/>
+          </a:p>
+        </p:txBody>
+      </p:sp>
+    </p:spTree>
+    <p:extLst>
+      <p:ext uri="{BB962C8B-B14F-4D97-AF65-F5344CB8AC3E}">
+        <p14:creationId xmlns:p14="http://schemas.microsoft.com/office/powerpoint/2010/main" val="1433731037"/>
       </p:ext>
     </p:extLst>
   </p:cSld>

</xml_diff>